<commit_message>
rename hands-on to labs
</commit_message>
<xml_diff>
--- a/aws-cloudformation/aws-cloudformation.pptx
+++ b/aws-cloudformation/aws-cloudformation.pptx
@@ -121,6 +121,22 @@
       </a:defRPr>
     </a:lvl9pPr>
   </p:defaultTextStyle>
+  <p:extLst>
+    <p:ext uri="{EFAFB233-063F-42B5-8137-9DF3F51BA10A}">
+      <p15:sldGuideLst xmlns:p15="http://schemas.microsoft.com/office/powerpoint/2012/main">
+        <p15:guide id="1" orient="horz" pos="2160">
+          <p15:clr>
+            <a:srgbClr val="A4A3A4"/>
+          </p15:clr>
+        </p15:guide>
+        <p15:guide id="2" pos="2880">
+          <p15:clr>
+            <a:srgbClr val="A4A3A4"/>
+          </p15:clr>
+        </p15:guide>
+      </p15:sldGuideLst>
+    </p:ext>
+  </p:extLst>
 </p:presentation>
 </file>
 
@@ -206,7 +222,7 @@
           <a:p>
             <a:fld id="{1B6676A5-1300-B945-98B1-DD92DDC3A3CB}" type="datetimeFigureOut">
               <a:rPr lang="en-US" smtClean="0"/>
-              <a:t>4/20/15</a:t>
+              <a:t>12/1/15</a:t>
             </a:fld>
             <a:endParaRPr lang="en-US"/>
           </a:p>
@@ -3404,7 +3420,7 @@
           <a:p>
             <a:fld id="{7CE38E4D-051A-41E1-86A4-E56916468FD0}" type="datetimeFigureOut">
               <a:rPr lang="en-US" smtClean="0"/>
-              <a:t>4/20/15</a:t>
+              <a:t>12/1/15</a:t>
             </a:fld>
             <a:endParaRPr lang="en-US"/>
           </a:p>
@@ -3585,7 +3601,7 @@
           <a:p>
             <a:fld id="{7CE38E4D-051A-41E1-86A4-E56916468FD0}" type="datetimeFigureOut">
               <a:rPr lang="en-US" smtClean="0"/>
-              <a:t>4/20/15</a:t>
+              <a:t>12/1/15</a:t>
             </a:fld>
             <a:endParaRPr lang="en-US"/>
           </a:p>
@@ -3736,7 +3752,7 @@
           <a:p>
             <a:fld id="{7CE38E4D-051A-41E1-86A4-E56916468FD0}" type="datetimeFigureOut">
               <a:rPr lang="en-US" smtClean="0"/>
-              <a:t>4/20/15</a:t>
+              <a:t>12/1/15</a:t>
             </a:fld>
             <a:endParaRPr lang="en-US"/>
           </a:p>
@@ -5562,7 +5578,7 @@
           <a:p>
             <a:fld id="{7CE38E4D-051A-41E1-86A4-E56916468FD0}" type="datetimeFigureOut">
               <a:rPr lang="en-US" smtClean="0"/>
-              <a:t>4/20/15</a:t>
+              <a:t>12/1/15</a:t>
             </a:fld>
             <a:endParaRPr lang="en-US"/>
           </a:p>
@@ -7432,7 +7448,7 @@
           <a:p>
             <a:fld id="{7CE38E4D-051A-41E1-86A4-E56916468FD0}" type="datetimeFigureOut">
               <a:rPr lang="en-US" smtClean="0"/>
-              <a:t>4/20/15</a:t>
+              <a:t>12/1/15</a:t>
             </a:fld>
             <a:endParaRPr lang="en-US"/>
           </a:p>
@@ -7545,7 +7561,7 @@
           <a:p>
             <a:fld id="{7CE38E4D-051A-41E1-86A4-E56916468FD0}" type="datetimeFigureOut">
               <a:rPr lang="en-US" smtClean="0"/>
-              <a:t>4/20/15</a:t>
+              <a:t>12/1/15</a:t>
             </a:fld>
             <a:endParaRPr lang="en-US"/>
           </a:p>
@@ -8086,7 +8102,7 @@
           <a:p>
             <a:fld id="{7CE38E4D-051A-41E1-86A4-E56916468FD0}" type="datetimeFigureOut">
               <a:rPr lang="en-US" smtClean="0"/>
-              <a:t>4/20/15</a:t>
+              <a:t>12/1/15</a:t>
             </a:fld>
             <a:endParaRPr lang="en-US"/>
           </a:p>
@@ -8199,7 +8215,7 @@
           <a:p>
             <a:fld id="{7CE38E4D-051A-41E1-86A4-E56916468FD0}" type="datetimeFigureOut">
               <a:rPr lang="en-US" smtClean="0"/>
-              <a:t>4/20/15</a:t>
+              <a:t>12/1/15</a:t>
             </a:fld>
             <a:endParaRPr lang="en-US"/>
           </a:p>
@@ -9910,7 +9926,7 @@
           <a:p>
             <a:fld id="{7CE38E4D-051A-41E1-86A4-E56916468FD0}" type="datetimeFigureOut">
               <a:rPr lang="en-US" smtClean="0"/>
-              <a:t>4/20/15</a:t>
+              <a:t>12/1/15</a:t>
             </a:fld>
             <a:endParaRPr lang="en-US"/>
           </a:p>
@@ -10061,7 +10077,7 @@
           <a:p>
             <a:fld id="{7CE38E4D-051A-41E1-86A4-E56916468FD0}" type="datetimeFigureOut">
               <a:rPr lang="en-US" smtClean="0"/>
-              <a:t>4/20/15</a:t>
+              <a:t>12/1/15</a:t>
             </a:fld>
             <a:endParaRPr lang="en-US"/>
           </a:p>
@@ -13676,7 +13692,7 @@
           <a:p>
             <a:fld id="{7CE38E4D-051A-41E1-86A4-E56916468FD0}" type="datetimeFigureOut">
               <a:rPr lang="en-US" smtClean="0"/>
-              <a:t>4/20/15</a:t>
+              <a:t>12/1/15</a:t>
             </a:fld>
             <a:endParaRPr lang="en-US"/>
           </a:p>
@@ -15535,7 +15551,7 @@
           <a:p>
             <a:fld id="{7CE38E4D-051A-41E1-86A4-E56916468FD0}" type="datetimeFigureOut">
               <a:rPr lang="en-US" smtClean="0"/>
-              <a:t>4/20/15</a:t>
+              <a:t>12/1/15</a:t>
             </a:fld>
             <a:endParaRPr lang="en-US"/>
           </a:p>
@@ -16105,11 +16121,7 @@
             </a:r>
             <a:r>
               <a:rPr lang="en-US" smtClean="0"/>
-              <a:t>Colin </a:t>
-            </a:r>
-            <a:r>
-              <a:rPr lang="en-US" smtClean="0"/>
-              <a:t>Johnson</a:t>
+              <a:t>Colin Johnson</a:t>
             </a:r>
             <a:endParaRPr lang="en-US" dirty="0" smtClean="0"/>
           </a:p>
@@ -16128,7 +16140,7 @@
   <p:timing>
     <p:tnLst>
       <p:par>
-        <p:cTn xmlns:p14="http://schemas.microsoft.com/office/powerpoint/2010/main" id="1" dur="indefinite" restart="never" nodeType="tmRoot"/>
+        <p:cTn id="1" dur="indefinite" restart="never" nodeType="tmRoot"/>
       </p:par>
     </p:tnLst>
   </p:timing>
@@ -16386,7 +16398,7 @@
   <p:timing>
     <p:tnLst>
       <p:par>
-        <p:cTn xmlns:p14="http://schemas.microsoft.com/office/powerpoint/2010/main" id="1" dur="indefinite" restart="never" nodeType="tmRoot"/>
+        <p:cTn id="1" dur="indefinite" restart="never" nodeType="tmRoot"/>
       </p:par>
     </p:tnLst>
   </p:timing>
@@ -16591,7 +16603,7 @@
   <p:timing>
     <p:tnLst>
       <p:par>
-        <p:cTn xmlns:p14="http://schemas.microsoft.com/office/powerpoint/2010/main" id="1" dur="indefinite" restart="never" nodeType="tmRoot"/>
+        <p:cTn id="1" dur="indefinite" restart="never" nodeType="tmRoot"/>
       </p:par>
     </p:tnLst>
   </p:timing>
@@ -16855,7 +16867,7 @@
   <p:timing>
     <p:tnLst>
       <p:par>
-        <p:cTn xmlns:p14="http://schemas.microsoft.com/office/powerpoint/2010/main" id="1" dur="indefinite" restart="never" nodeType="tmRoot"/>
+        <p:cTn id="1" dur="indefinite" restart="never" nodeType="tmRoot"/>
       </p:par>
     </p:tnLst>
   </p:timing>
@@ -17005,7 +17017,7 @@
   <p:timing>
     <p:tnLst>
       <p:par>
-        <p:cTn xmlns:p14="http://schemas.microsoft.com/office/powerpoint/2010/main" id="1" dur="indefinite" restart="never" nodeType="tmRoot"/>
+        <p:cTn id="1" dur="indefinite" restart="never" nodeType="tmRoot"/>
       </p:par>
     </p:tnLst>
   </p:timing>
@@ -17166,7 +17178,7 @@
   <p:timing>
     <p:tnLst>
       <p:par>
-        <p:cTn xmlns:p14="http://schemas.microsoft.com/office/powerpoint/2010/main" id="1" dur="indefinite" restart="never" nodeType="tmRoot"/>
+        <p:cTn id="1" dur="indefinite" restart="never" nodeType="tmRoot"/>
       </p:par>
     </p:tnLst>
   </p:timing>
@@ -17299,7 +17311,7 @@
   <p:timing>
     <p:tnLst>
       <p:par>
-        <p:cTn xmlns:p14="http://schemas.microsoft.com/office/powerpoint/2010/main" id="1" dur="indefinite" restart="never" nodeType="tmRoot"/>
+        <p:cTn id="1" dur="indefinite" restart="never" nodeType="tmRoot"/>
       </p:par>
     </p:tnLst>
   </p:timing>
@@ -17430,7 +17442,7 @@
   <p:timing>
     <p:tnLst>
       <p:par>
-        <p:cTn xmlns:p14="http://schemas.microsoft.com/office/powerpoint/2010/main" id="1" dur="indefinite" restart="never" nodeType="tmRoot"/>
+        <p:cTn id="1" dur="indefinite" restart="never" nodeType="tmRoot"/>
       </p:par>
     </p:tnLst>
   </p:timing>
@@ -17551,7 +17563,7 @@
   <p:timing>
     <p:tnLst>
       <p:par>
-        <p:cTn xmlns:p14="http://schemas.microsoft.com/office/powerpoint/2010/main" id="1" dur="indefinite" restart="never" nodeType="tmRoot"/>
+        <p:cTn id="1" dur="indefinite" restart="never" nodeType="tmRoot"/>
       </p:par>
     </p:tnLst>
   </p:timing>
@@ -17659,7 +17671,7 @@
   <p:timing>
     <p:tnLst>
       <p:par>
-        <p:cTn xmlns:p14="http://schemas.microsoft.com/office/powerpoint/2010/main" id="1" dur="indefinite" restart="never" nodeType="tmRoot"/>
+        <p:cTn id="1" dur="indefinite" restart="never" nodeType="tmRoot"/>
       </p:par>
     </p:tnLst>
   </p:timing>
@@ -17810,7 +17822,7 @@
   <p:timing>
     <p:tnLst>
       <p:par>
-        <p:cTn xmlns:p14="http://schemas.microsoft.com/office/powerpoint/2010/main" id="1" dur="indefinite" restart="never" nodeType="tmRoot"/>
+        <p:cTn id="1" dur="indefinite" restart="never" nodeType="tmRoot"/>
       </p:par>
     </p:tnLst>
   </p:timing>
@@ -17912,8 +17924,8 @@
           <a:lstStyle/>
           <a:p>
             <a:r>
-              <a:rPr lang="en-US" dirty="0" smtClean="0"/>
-              <a:t>Hands On: </a:t>
+              <a:rPr lang="en-US" smtClean="0"/>
+              <a:t>Labs: </a:t>
             </a:r>
             <a:r>
               <a:rPr lang="en-US" dirty="0" err="1" smtClean="0"/>
@@ -17936,7 +17948,7 @@
   <p:timing>
     <p:tnLst>
       <p:par>
-        <p:cTn xmlns:p14="http://schemas.microsoft.com/office/powerpoint/2010/main" id="1" dur="indefinite" restart="never" nodeType="tmRoot"/>
+        <p:cTn id="1" dur="indefinite" restart="never" nodeType="tmRoot"/>
       </p:par>
     </p:tnLst>
   </p:timing>
@@ -18065,7 +18077,7 @@
   <p:timing>
     <p:tnLst>
       <p:par>
-        <p:cTn xmlns:p14="http://schemas.microsoft.com/office/powerpoint/2010/main" id="1" dur="indefinite" restart="never" nodeType="tmRoot"/>
+        <p:cTn id="1" dur="indefinite" restart="never" nodeType="tmRoot"/>
       </p:par>
     </p:tnLst>
   </p:timing>
@@ -18215,7 +18227,7 @@
   <p:timing>
     <p:tnLst>
       <p:par>
-        <p:cTn xmlns:p14="http://schemas.microsoft.com/office/powerpoint/2010/main" id="1" dur="indefinite" restart="never" nodeType="tmRoot"/>
+        <p:cTn id="1" dur="indefinite" restart="never" nodeType="tmRoot"/>
       </p:par>
     </p:tnLst>
   </p:timing>
@@ -18333,7 +18345,7 @@
   <p:timing>
     <p:tnLst>
       <p:par>
-        <p:cTn xmlns:p14="http://schemas.microsoft.com/office/powerpoint/2010/main" id="1" dur="indefinite" restart="never" nodeType="tmRoot"/>
+        <p:cTn id="1" dur="indefinite" restart="never" nodeType="tmRoot"/>
       </p:par>
     </p:tnLst>
   </p:timing>

</xml_diff>

<commit_message>
various updates including update to Ubuntu 14.04.3 LTS release 20151117
</commit_message>
<xml_diff>
--- a/aws-cloudformation/aws-cloudformation.pptx
+++ b/aws-cloudformation/aws-cloudformation.pptx
@@ -222,7 +222,7 @@
           <a:p>
             <a:fld id="{1B6676A5-1300-B945-98B1-DD92DDC3A3CB}" type="datetimeFigureOut">
               <a:rPr lang="en-US" smtClean="0"/>
-              <a:t>12/1/15</a:t>
+              <a:t>12/2/15</a:t>
             </a:fld>
             <a:endParaRPr lang="en-US"/>
           </a:p>
@@ -3420,7 +3420,7 @@
           <a:p>
             <a:fld id="{7CE38E4D-051A-41E1-86A4-E56916468FD0}" type="datetimeFigureOut">
               <a:rPr lang="en-US" smtClean="0"/>
-              <a:t>12/1/15</a:t>
+              <a:t>12/2/15</a:t>
             </a:fld>
             <a:endParaRPr lang="en-US"/>
           </a:p>
@@ -3601,7 +3601,7 @@
           <a:p>
             <a:fld id="{7CE38E4D-051A-41E1-86A4-E56916468FD0}" type="datetimeFigureOut">
               <a:rPr lang="en-US" smtClean="0"/>
-              <a:t>12/1/15</a:t>
+              <a:t>12/2/15</a:t>
             </a:fld>
             <a:endParaRPr lang="en-US"/>
           </a:p>
@@ -3752,7 +3752,7 @@
           <a:p>
             <a:fld id="{7CE38E4D-051A-41E1-86A4-E56916468FD0}" type="datetimeFigureOut">
               <a:rPr lang="en-US" smtClean="0"/>
-              <a:t>12/1/15</a:t>
+              <a:t>12/2/15</a:t>
             </a:fld>
             <a:endParaRPr lang="en-US"/>
           </a:p>
@@ -5578,7 +5578,7 @@
           <a:p>
             <a:fld id="{7CE38E4D-051A-41E1-86A4-E56916468FD0}" type="datetimeFigureOut">
               <a:rPr lang="en-US" smtClean="0"/>
-              <a:t>12/1/15</a:t>
+              <a:t>12/2/15</a:t>
             </a:fld>
             <a:endParaRPr lang="en-US"/>
           </a:p>
@@ -7448,7 +7448,7 @@
           <a:p>
             <a:fld id="{7CE38E4D-051A-41E1-86A4-E56916468FD0}" type="datetimeFigureOut">
               <a:rPr lang="en-US" smtClean="0"/>
-              <a:t>12/1/15</a:t>
+              <a:t>12/2/15</a:t>
             </a:fld>
             <a:endParaRPr lang="en-US"/>
           </a:p>
@@ -7561,7 +7561,7 @@
           <a:p>
             <a:fld id="{7CE38E4D-051A-41E1-86A4-E56916468FD0}" type="datetimeFigureOut">
               <a:rPr lang="en-US" smtClean="0"/>
-              <a:t>12/1/15</a:t>
+              <a:t>12/2/15</a:t>
             </a:fld>
             <a:endParaRPr lang="en-US"/>
           </a:p>
@@ -8102,7 +8102,7 @@
           <a:p>
             <a:fld id="{7CE38E4D-051A-41E1-86A4-E56916468FD0}" type="datetimeFigureOut">
               <a:rPr lang="en-US" smtClean="0"/>
-              <a:t>12/1/15</a:t>
+              <a:t>12/2/15</a:t>
             </a:fld>
             <a:endParaRPr lang="en-US"/>
           </a:p>
@@ -8215,7 +8215,7 @@
           <a:p>
             <a:fld id="{7CE38E4D-051A-41E1-86A4-E56916468FD0}" type="datetimeFigureOut">
               <a:rPr lang="en-US" smtClean="0"/>
-              <a:t>12/1/15</a:t>
+              <a:t>12/2/15</a:t>
             </a:fld>
             <a:endParaRPr lang="en-US"/>
           </a:p>
@@ -9926,7 +9926,7 @@
           <a:p>
             <a:fld id="{7CE38E4D-051A-41E1-86A4-E56916468FD0}" type="datetimeFigureOut">
               <a:rPr lang="en-US" smtClean="0"/>
-              <a:t>12/1/15</a:t>
+              <a:t>12/2/15</a:t>
             </a:fld>
             <a:endParaRPr lang="en-US"/>
           </a:p>
@@ -10077,7 +10077,7 @@
           <a:p>
             <a:fld id="{7CE38E4D-051A-41E1-86A4-E56916468FD0}" type="datetimeFigureOut">
               <a:rPr lang="en-US" smtClean="0"/>
-              <a:t>12/1/15</a:t>
+              <a:t>12/2/15</a:t>
             </a:fld>
             <a:endParaRPr lang="en-US"/>
           </a:p>
@@ -13692,7 +13692,7 @@
           <a:p>
             <a:fld id="{7CE38E4D-051A-41E1-86A4-E56916468FD0}" type="datetimeFigureOut">
               <a:rPr lang="en-US" smtClean="0"/>
-              <a:t>12/1/15</a:t>
+              <a:t>12/2/15</a:t>
             </a:fld>
             <a:endParaRPr lang="en-US"/>
           </a:p>
@@ -15551,7 +15551,7 @@
           <a:p>
             <a:fld id="{7CE38E4D-051A-41E1-86A4-E56916468FD0}" type="datetimeFigureOut">
               <a:rPr lang="en-US" smtClean="0"/>
-              <a:t>12/1/15</a:t>
+              <a:t>12/2/15</a:t>
             </a:fld>
             <a:endParaRPr lang="en-US"/>
           </a:p>
@@ -16183,7 +16183,19 @@
           <a:p>
             <a:r>
               <a:rPr lang="en-US" dirty="0" smtClean="0"/>
-              <a:t>Parameters can be used to pass variables into a stack for usage,, allowing greater control.</a:t>
+              <a:t>Parameters can be used to pass variables into a stack for </a:t>
+            </a:r>
+            <a:r>
+              <a:rPr lang="en-US" smtClean="0"/>
+              <a:t>usage</a:t>
+            </a:r>
+            <a:r>
+              <a:rPr lang="en-US" smtClean="0"/>
+              <a:t>, </a:t>
+            </a:r>
+            <a:r>
+              <a:rPr lang="en-US" dirty="0" smtClean="0"/>
+              <a:t>allowing greater control.</a:t>
             </a:r>
           </a:p>
           <a:p>
@@ -17485,8 +17497,13 @@
           <a:p>
             <a:r>
               <a:rPr lang="en-US" dirty="0" smtClean="0"/>
-              <a:t>Provision AWS Resources using JSON</a:t>
-            </a:r>
+              <a:t>Provision AWS Resources using </a:t>
+            </a:r>
+            <a:r>
+              <a:rPr lang="en-US" dirty="0" smtClean="0"/>
+              <a:t>a JSON File</a:t>
+            </a:r>
+            <a:endParaRPr lang="en-US" dirty="0" smtClean="0"/>
           </a:p>
           <a:p>
             <a:r>
@@ -18137,7 +18154,15 @@
             </a:r>
             <a:r>
               <a:rPr lang="en-US" dirty="0" smtClean="0"/>
-              <a:t>: specifies the AWS Template version the stack conforms to</a:t>
+              <a:t>: specifies the AWS Template version the </a:t>
+            </a:r>
+            <a:r>
+              <a:rPr lang="en-US" dirty="0" smtClean="0"/>
+              <a:t>file </a:t>
+            </a:r>
+            <a:r>
+              <a:rPr lang="en-US" dirty="0" smtClean="0"/>
+              <a:t>conforms to</a:t>
             </a:r>
             <a:endParaRPr lang="en-US" dirty="0"/>
           </a:p>

</xml_diff>